<commit_message>
Added functional requirements, force sensor class
</commit_message>
<xml_diff>
--- a/pln/Architecture.pptx
+++ b/pln/Architecture.pptx
@@ -696,7 +696,7 @@
           <a:p>
             <a:fld id="{4CA0312B-865C-4F06-9992-BCE01F8A166F}" type="datetimeFigureOut">
               <a:rPr lang="en-US" smtClean="0"/>
-              <a:t>6/26/2021</a:t>
+              <a:t>6/27/2021</a:t>
             </a:fld>
             <a:endParaRPr lang="en-US"/>
           </a:p>
@@ -894,7 +894,7 @@
           <a:p>
             <a:fld id="{4CA0312B-865C-4F06-9992-BCE01F8A166F}" type="datetimeFigureOut">
               <a:rPr lang="en-US" smtClean="0"/>
-              <a:t>6/26/2021</a:t>
+              <a:t>6/27/2021</a:t>
             </a:fld>
             <a:endParaRPr lang="en-US"/>
           </a:p>
@@ -1102,7 +1102,7 @@
           <a:p>
             <a:fld id="{4CA0312B-865C-4F06-9992-BCE01F8A166F}" type="datetimeFigureOut">
               <a:rPr lang="en-US" smtClean="0"/>
-              <a:t>6/26/2021</a:t>
+              <a:t>6/27/2021</a:t>
             </a:fld>
             <a:endParaRPr lang="en-US"/>
           </a:p>
@@ -1300,7 +1300,7 @@
           <a:p>
             <a:fld id="{4CA0312B-865C-4F06-9992-BCE01F8A166F}" type="datetimeFigureOut">
               <a:rPr lang="en-US" smtClean="0"/>
-              <a:t>6/26/2021</a:t>
+              <a:t>6/27/2021</a:t>
             </a:fld>
             <a:endParaRPr lang="en-US"/>
           </a:p>
@@ -1575,7 +1575,7 @@
           <a:p>
             <a:fld id="{4CA0312B-865C-4F06-9992-BCE01F8A166F}" type="datetimeFigureOut">
               <a:rPr lang="en-US" smtClean="0"/>
-              <a:t>6/26/2021</a:t>
+              <a:t>6/27/2021</a:t>
             </a:fld>
             <a:endParaRPr lang="en-US"/>
           </a:p>
@@ -1840,7 +1840,7 @@
           <a:p>
             <a:fld id="{4CA0312B-865C-4F06-9992-BCE01F8A166F}" type="datetimeFigureOut">
               <a:rPr lang="en-US" smtClean="0"/>
-              <a:t>6/26/2021</a:t>
+              <a:t>6/27/2021</a:t>
             </a:fld>
             <a:endParaRPr lang="en-US"/>
           </a:p>
@@ -2252,7 +2252,7 @@
           <a:p>
             <a:fld id="{4CA0312B-865C-4F06-9992-BCE01F8A166F}" type="datetimeFigureOut">
               <a:rPr lang="en-US" smtClean="0"/>
-              <a:t>6/26/2021</a:t>
+              <a:t>6/27/2021</a:t>
             </a:fld>
             <a:endParaRPr lang="en-US"/>
           </a:p>
@@ -2393,7 +2393,7 @@
           <a:p>
             <a:fld id="{4CA0312B-865C-4F06-9992-BCE01F8A166F}" type="datetimeFigureOut">
               <a:rPr lang="en-US" smtClean="0"/>
-              <a:t>6/26/2021</a:t>
+              <a:t>6/27/2021</a:t>
             </a:fld>
             <a:endParaRPr lang="en-US"/>
           </a:p>
@@ -2506,7 +2506,7 @@
           <a:p>
             <a:fld id="{4CA0312B-865C-4F06-9992-BCE01F8A166F}" type="datetimeFigureOut">
               <a:rPr lang="en-US" smtClean="0"/>
-              <a:t>6/26/2021</a:t>
+              <a:t>6/27/2021</a:t>
             </a:fld>
             <a:endParaRPr lang="en-US"/>
           </a:p>
@@ -2817,7 +2817,7 @@
           <a:p>
             <a:fld id="{4CA0312B-865C-4F06-9992-BCE01F8A166F}" type="datetimeFigureOut">
               <a:rPr lang="en-US" smtClean="0"/>
-              <a:t>6/26/2021</a:t>
+              <a:t>6/27/2021</a:t>
             </a:fld>
             <a:endParaRPr lang="en-US"/>
           </a:p>
@@ -3105,7 +3105,7 @@
           <a:p>
             <a:fld id="{4CA0312B-865C-4F06-9992-BCE01F8A166F}" type="datetimeFigureOut">
               <a:rPr lang="en-US" smtClean="0"/>
-              <a:t>6/26/2021</a:t>
+              <a:t>6/27/2021</a:t>
             </a:fld>
             <a:endParaRPr lang="en-US"/>
           </a:p>
@@ -3346,7 +3346,7 @@
           <a:p>
             <a:fld id="{4CA0312B-865C-4F06-9992-BCE01F8A166F}" type="datetimeFigureOut">
               <a:rPr lang="en-US" smtClean="0"/>
-              <a:t>6/26/2021</a:t>
+              <a:t>6/27/2021</a:t>
             </a:fld>
             <a:endParaRPr lang="en-US"/>
           </a:p>

</xml_diff>